<commit_message>
Module 4 link fixes
</commit_message>
<xml_diff>
--- a/Complimentary Course Content/Module4/Lessons/Module4_Lesson01 Big Data and Hadoop.pptx
+++ b/Complimentary Course Content/Module4/Lessons/Module4_Lesson01 Big Data and Hadoop.pptx
@@ -131,7 +131,7 @@
   </p:defaultTextStyle>
   <p:extLst>
     <p:ext uri="{EFAFB233-063F-42B5-8137-9DF3F51BA10A}">
-      <p15:sldGuideLst xmlns:p15="http://schemas.microsoft.com/office/powerpoint/2012/main" xmlns="">
+      <p15:sldGuideLst xmlns:p15="http://schemas.microsoft.com/office/powerpoint/2012/main">
         <p15:guide id="1" orient="horz" pos="2160">
           <p15:clr>
             <a:srgbClr val="A4A3A4"/>
@@ -170,20 +170,6 @@
     <p:extLst/>
   </p:cmAuthor>
 </p:cmAuthorLst>
-</file>
-
-<file path=ppt/comments/comment1.xml><?xml version="1.0" encoding="utf-8"?>
-<p:cmLst xmlns:a="http://schemas.openxmlformats.org/drawingml/2006/main" xmlns:r="http://schemas.openxmlformats.org/officeDocument/2006/relationships" xmlns:p="http://schemas.openxmlformats.org/presentationml/2006/main">
-  <p:cm authorId="2" dt="2016-05-16T21:08:05.367" idx="2">
-    <p:pos x="-9" y="10"/>
-    <p:text>Jongwook is this graphic a good graphic representation?</p:text>
-    <p:extLst mod="1">
-      <p:ext uri="{C676402C-5697-4E1C-873F-D02D1690AC5C}">
-        <p15:threadingInfo xmlns:p15="http://schemas.microsoft.com/office/powerpoint/2012/main" timeZoneBias="360"/>
-      </p:ext>
-    </p:extLst>
-  </p:cm>
-</p:cmLst>
 </file>
 
 <file path=ppt/notesMasters/notesMaster1.xml><?xml version="1.0" encoding="utf-8"?>
@@ -269,7 +255,7 @@
             <a:fld id="{49B60EF2-7028-489F-85D8-FE86CD7CF2A0}" type="datetimeFigureOut">
               <a:rPr lang="en-US" smtClean="0"/>
               <a:pPr/>
-              <a:t>7/13/16</a:t>
+              <a:t>9/15/16</a:t>
             </a:fld>
             <a:endParaRPr lang="en-US"/>
           </a:p>
@@ -5825,7 +5811,7 @@
             <a:fld id="{0459C166-16D3-4A25-A2F8-C51E0E346B22}" type="datetimeFigureOut">
               <a:rPr lang="en-US" smtClean="0"/>
               <a:pPr/>
-              <a:t>7/13/16</a:t>
+              <a:t>9/15/16</a:t>
             </a:fld>
             <a:endParaRPr lang="en-US"/>
           </a:p>
@@ -6191,7 +6177,7 @@
             <a:fld id="{0459C166-16D3-4A25-A2F8-C51E0E346B22}" type="datetimeFigureOut">
               <a:rPr lang="en-US" smtClean="0"/>
               <a:pPr/>
-              <a:t>7/13/16</a:t>
+              <a:t>9/15/16</a:t>
             </a:fld>
             <a:endParaRPr lang="en-US"/>
           </a:p>
@@ -6310,7 +6296,7 @@
             <a:fld id="{0459C166-16D3-4A25-A2F8-C51E0E346B22}" type="datetimeFigureOut">
               <a:rPr lang="en-US" smtClean="0"/>
               <a:pPr/>
-              <a:t>7/13/16</a:t>
+              <a:t>9/15/16</a:t>
             </a:fld>
             <a:endParaRPr lang="en-US"/>
           </a:p>
@@ -6407,7 +6393,7 @@
             <a:fld id="{0459C166-16D3-4A25-A2F8-C51E0E346B22}" type="datetimeFigureOut">
               <a:rPr lang="en-US" smtClean="0"/>
               <a:pPr/>
-              <a:t>7/13/16</a:t>
+              <a:t>9/15/16</a:t>
             </a:fld>
             <a:endParaRPr lang="en-US"/>
           </a:p>
@@ -6684,7 +6670,7 @@
             <a:fld id="{0459C166-16D3-4A25-A2F8-C51E0E346B22}" type="datetimeFigureOut">
               <a:rPr lang="en-US" smtClean="0"/>
               <a:pPr/>
-              <a:t>7/13/16</a:t>
+              <a:t>9/15/16</a:t>
             </a:fld>
             <a:endParaRPr lang="en-US"/>
           </a:p>
@@ -6938,7 +6924,7 @@
             <a:fld id="{0459C166-16D3-4A25-A2F8-C51E0E346B22}" type="datetimeFigureOut">
               <a:rPr lang="en-US" smtClean="0"/>
               <a:pPr/>
-              <a:t>7/13/16</a:t>
+              <a:t>9/15/16</a:t>
             </a:fld>
             <a:endParaRPr lang="en-US"/>
           </a:p>
@@ -7108,7 +7094,7 @@
             <a:fld id="{0459C166-16D3-4A25-A2F8-C51E0E346B22}" type="datetimeFigureOut">
               <a:rPr lang="en-US" smtClean="0"/>
               <a:pPr/>
-              <a:t>7/13/16</a:t>
+              <a:t>9/15/16</a:t>
             </a:fld>
             <a:endParaRPr lang="en-US"/>
           </a:p>
@@ -7288,7 +7274,7 @@
             <a:fld id="{0459C166-16D3-4A25-A2F8-C51E0E346B22}" type="datetimeFigureOut">
               <a:rPr lang="en-US" smtClean="0"/>
               <a:pPr/>
-              <a:t>7/13/16</a:t>
+              <a:t>9/15/16</a:t>
             </a:fld>
             <a:endParaRPr lang="en-US"/>
           </a:p>
@@ -7458,7 +7444,7 @@
             <a:fld id="{0459C166-16D3-4A25-A2F8-C51E0E346B22}" type="datetimeFigureOut">
               <a:rPr lang="en-US" smtClean="0"/>
               <a:pPr/>
-              <a:t>7/13/16</a:t>
+              <a:t>9/15/16</a:t>
             </a:fld>
             <a:endParaRPr lang="en-US"/>
           </a:p>
@@ -7723,7 +7709,7 @@
             <a:fld id="{0459C166-16D3-4A25-A2F8-C51E0E346B22}" type="datetimeFigureOut">
               <a:rPr lang="en-US" smtClean="0"/>
               <a:pPr/>
-              <a:t>7/13/16</a:t>
+              <a:t>9/15/16</a:t>
             </a:fld>
             <a:endParaRPr lang="en-US"/>
           </a:p>
@@ -8040,7 +8026,7 @@
             <a:fld id="{0459C166-16D3-4A25-A2F8-C51E0E346B22}" type="datetimeFigureOut">
               <a:rPr lang="en-US" smtClean="0"/>
               <a:pPr/>
-              <a:t>7/13/16</a:t>
+              <a:t>9/15/16</a:t>
             </a:fld>
             <a:endParaRPr lang="en-US"/>
           </a:p>
@@ -8319,7 +8305,7 @@
             <a:fld id="{0459C166-16D3-4A25-A2F8-C51E0E346B22}" type="datetimeFigureOut">
               <a:rPr lang="en-US" smtClean="0"/>
               <a:pPr/>
-              <a:t>7/13/16</a:t>
+              <a:t>9/15/16</a:t>
             </a:fld>
             <a:endParaRPr lang="en-US"/>
           </a:p>
@@ -9308,7 +9294,7 @@
             <a:fld id="{0459C166-16D3-4A25-A2F8-C51E0E346B22}" type="datetimeFigureOut">
               <a:rPr lang="en-US" smtClean="0"/>
               <a:pPr/>
-              <a:t>7/13/16</a:t>
+              <a:t>9/15/16</a:t>
             </a:fld>
             <a:endParaRPr lang="en-US"/>
           </a:p>
@@ -9521,7 +9507,7 @@
             <a:fld id="{0459C166-16D3-4A25-A2F8-C51E0E346B22}" type="datetimeFigureOut">
               <a:rPr lang="en-US" smtClean="0"/>
               <a:pPr/>
-              <a:t>7/13/16</a:t>
+              <a:t>9/15/16</a:t>
             </a:fld>
             <a:endParaRPr lang="en-US"/>
           </a:p>
@@ -12907,14 +12893,14 @@
                 <a:gridCol w="3721592">
                   <a:extLst>
                     <a:ext uri="{9D8B030D-6E8A-4147-A177-3AD203B41FA5}">
-                      <a16:colId xmlns:a16="http://schemas.microsoft.com/office/drawing/2014/main" xmlns="" val="48614039"/>
+                      <a16:colId xmlns="" xmlns:a16="http://schemas.microsoft.com/office/drawing/2014/main" val="48614039"/>
                     </a:ext>
                   </a:extLst>
                 </a:gridCol>
                 <a:gridCol w="6769986">
                   <a:extLst>
                     <a:ext uri="{9D8B030D-6E8A-4147-A177-3AD203B41FA5}">
-                      <a16:colId xmlns:a16="http://schemas.microsoft.com/office/drawing/2014/main" xmlns="" val="1124546490"/>
+                      <a16:colId xmlns="" xmlns:a16="http://schemas.microsoft.com/office/drawing/2014/main" val="1124546490"/>
                     </a:ext>
                   </a:extLst>
                 </a:gridCol>
@@ -12971,7 +12957,7 @@
                 </a:tc>
                 <a:extLst>
                   <a:ext uri="{0D108BD9-81ED-4DB2-BD59-A6C34878D82A}">
-                    <a16:rowId xmlns:a16="http://schemas.microsoft.com/office/drawing/2014/main" xmlns="" val="679667022"/>
+                    <a16:rowId xmlns="" xmlns:a16="http://schemas.microsoft.com/office/drawing/2014/main" val="679667022"/>
                   </a:ext>
                 </a:extLst>
               </a:tr>
@@ -13050,7 +13036,7 @@
                 </a:tc>
                 <a:extLst>
                   <a:ext uri="{0D108BD9-81ED-4DB2-BD59-A6C34878D82A}">
-                    <a16:rowId xmlns:a16="http://schemas.microsoft.com/office/drawing/2014/main" xmlns="" val="2034482246"/>
+                    <a16:rowId xmlns="" xmlns:a16="http://schemas.microsoft.com/office/drawing/2014/main" val="2034482246"/>
                   </a:ext>
                 </a:extLst>
               </a:tr>
@@ -13107,7 +13093,7 @@
                 </a:tc>
                 <a:extLst>
                   <a:ext uri="{0D108BD9-81ED-4DB2-BD59-A6C34878D82A}">
-                    <a16:rowId xmlns:a16="http://schemas.microsoft.com/office/drawing/2014/main" xmlns="" val="682465758"/>
+                    <a16:rowId xmlns="" xmlns:a16="http://schemas.microsoft.com/office/drawing/2014/main" val="682465758"/>
                   </a:ext>
                 </a:extLst>
               </a:tr>
@@ -13166,7 +13152,7 @@
                 </a:tc>
                 <a:extLst>
                   <a:ext uri="{0D108BD9-81ED-4DB2-BD59-A6C34878D82A}">
-                    <a16:rowId xmlns:a16="http://schemas.microsoft.com/office/drawing/2014/main" xmlns="" val="4230228483"/>
+                    <a16:rowId xmlns="" xmlns:a16="http://schemas.microsoft.com/office/drawing/2014/main" val="4230228483"/>
                   </a:ext>
                 </a:extLst>
               </a:tr>
@@ -18769,21 +18755,21 @@
                 <a:gridCol w="2486742">
                   <a:extLst>
                     <a:ext uri="{9D8B030D-6E8A-4147-A177-3AD203B41FA5}">
-                      <a16:colId xmlns:a16="http://schemas.microsoft.com/office/drawing/2014/main" xmlns="" val="48614039"/>
+                      <a16:colId xmlns="" xmlns:a16="http://schemas.microsoft.com/office/drawing/2014/main" val="48614039"/>
                     </a:ext>
                   </a:extLst>
                 </a:gridCol>
                 <a:gridCol w="4523658">
                   <a:extLst>
                     <a:ext uri="{9D8B030D-6E8A-4147-A177-3AD203B41FA5}">
-                      <a16:colId xmlns:a16="http://schemas.microsoft.com/office/drawing/2014/main" xmlns="" val="1124546490"/>
+                      <a16:colId xmlns="" xmlns:a16="http://schemas.microsoft.com/office/drawing/2014/main" val="1124546490"/>
                     </a:ext>
                   </a:extLst>
                 </a:gridCol>
                 <a:gridCol w="3505200">
                   <a:extLst>
                     <a:ext uri="{9D8B030D-6E8A-4147-A177-3AD203B41FA5}">
-                      <a16:colId xmlns:a16="http://schemas.microsoft.com/office/drawing/2014/main" xmlns="" val="2986980724"/>
+                      <a16:colId xmlns="" xmlns:a16="http://schemas.microsoft.com/office/drawing/2014/main" val="2986980724"/>
                     </a:ext>
                   </a:extLst>
                 </a:gridCol>
@@ -18859,7 +18845,7 @@
                 </a:tc>
                 <a:extLst>
                   <a:ext uri="{0D108BD9-81ED-4DB2-BD59-A6C34878D82A}">
-                    <a16:rowId xmlns:a16="http://schemas.microsoft.com/office/drawing/2014/main" xmlns="" val="679667022"/>
+                    <a16:rowId xmlns="" xmlns:a16="http://schemas.microsoft.com/office/drawing/2014/main" val="679667022"/>
                   </a:ext>
                 </a:extLst>
               </a:tr>
@@ -18935,7 +18921,7 @@
                 </a:tc>
                 <a:extLst>
                   <a:ext uri="{0D108BD9-81ED-4DB2-BD59-A6C34878D82A}">
-                    <a16:rowId xmlns:a16="http://schemas.microsoft.com/office/drawing/2014/main" xmlns="" val="2034482246"/>
+                    <a16:rowId xmlns="" xmlns:a16="http://schemas.microsoft.com/office/drawing/2014/main" val="2034482246"/>
                   </a:ext>
                 </a:extLst>
               </a:tr>
@@ -19017,7 +19003,7 @@
                 </a:tc>
                 <a:extLst>
                   <a:ext uri="{0D108BD9-81ED-4DB2-BD59-A6C34878D82A}">
-                    <a16:rowId xmlns:a16="http://schemas.microsoft.com/office/drawing/2014/main" xmlns="" val="682465758"/>
+                    <a16:rowId xmlns="" xmlns:a16="http://schemas.microsoft.com/office/drawing/2014/main" val="682465758"/>
                   </a:ext>
                 </a:extLst>
               </a:tr>
@@ -19084,7 +19070,7 @@
                 </a:tc>
                 <a:extLst>
                   <a:ext uri="{0D108BD9-81ED-4DB2-BD59-A6C34878D82A}">
-                    <a16:rowId xmlns:a16="http://schemas.microsoft.com/office/drawing/2014/main" xmlns="" val="4230228483"/>
+                    <a16:rowId xmlns="" xmlns:a16="http://schemas.microsoft.com/office/drawing/2014/main" val="4230228483"/>
                   </a:ext>
                 </a:extLst>
               </a:tr>
@@ -19156,7 +19142,7 @@
                 </a:tc>
                 <a:extLst>
                   <a:ext uri="{0D108BD9-81ED-4DB2-BD59-A6C34878D82A}">
-                    <a16:rowId xmlns:a16="http://schemas.microsoft.com/office/drawing/2014/main" xmlns="" val="3329658239"/>
+                    <a16:rowId xmlns="" xmlns:a16="http://schemas.microsoft.com/office/drawing/2014/main" val="3329658239"/>
                   </a:ext>
                 </a:extLst>
               </a:tr>
@@ -21906,14 +21892,14 @@
                 <a:gridCol w="3636005">
                   <a:extLst>
                     <a:ext uri="{9D8B030D-6E8A-4147-A177-3AD203B41FA5}">
-                      <a16:colId xmlns:a16="http://schemas.microsoft.com/office/drawing/2014/main" xmlns="" val="48614039"/>
+                      <a16:colId xmlns="" xmlns:a16="http://schemas.microsoft.com/office/drawing/2014/main" val="48614039"/>
                     </a:ext>
                   </a:extLst>
                 </a:gridCol>
                 <a:gridCol w="6614293">
                   <a:extLst>
                     <a:ext uri="{9D8B030D-6E8A-4147-A177-3AD203B41FA5}">
-                      <a16:colId xmlns:a16="http://schemas.microsoft.com/office/drawing/2014/main" xmlns="" val="1124546490"/>
+                      <a16:colId xmlns="" xmlns:a16="http://schemas.microsoft.com/office/drawing/2014/main" val="1124546490"/>
                     </a:ext>
                   </a:extLst>
                 </a:gridCol>
@@ -21965,7 +21951,7 @@
                 </a:tc>
                 <a:extLst>
                   <a:ext uri="{0D108BD9-81ED-4DB2-BD59-A6C34878D82A}">
-                    <a16:rowId xmlns:a16="http://schemas.microsoft.com/office/drawing/2014/main" xmlns="" val="679667022"/>
+                    <a16:rowId xmlns="" xmlns:a16="http://schemas.microsoft.com/office/drawing/2014/main" val="679667022"/>
                   </a:ext>
                 </a:extLst>
               </a:tr>
@@ -22012,7 +21998,7 @@
                 </a:tc>
                 <a:extLst>
                   <a:ext uri="{0D108BD9-81ED-4DB2-BD59-A6C34878D82A}">
-                    <a16:rowId xmlns:a16="http://schemas.microsoft.com/office/drawing/2014/main" xmlns="" val="2034482246"/>
+                    <a16:rowId xmlns="" xmlns:a16="http://schemas.microsoft.com/office/drawing/2014/main" val="2034482246"/>
                   </a:ext>
                 </a:extLst>
               </a:tr>
@@ -22059,7 +22045,7 @@
                 </a:tc>
                 <a:extLst>
                   <a:ext uri="{0D108BD9-81ED-4DB2-BD59-A6C34878D82A}">
-                    <a16:rowId xmlns:a16="http://schemas.microsoft.com/office/drawing/2014/main" xmlns="" val="682465758"/>
+                    <a16:rowId xmlns="" xmlns:a16="http://schemas.microsoft.com/office/drawing/2014/main" val="682465758"/>
                   </a:ext>
                 </a:extLst>
               </a:tr>
@@ -22106,7 +22092,7 @@
                 </a:tc>
                 <a:extLst>
                   <a:ext uri="{0D108BD9-81ED-4DB2-BD59-A6C34878D82A}">
-                    <a16:rowId xmlns:a16="http://schemas.microsoft.com/office/drawing/2014/main" xmlns="" val="4230228483"/>
+                    <a16:rowId xmlns="" xmlns:a16="http://schemas.microsoft.com/office/drawing/2014/main" val="4230228483"/>
                   </a:ext>
                 </a:extLst>
               </a:tr>
@@ -22464,14 +22450,14 @@
                 <a:gridCol w="3706437">
                   <a:extLst>
                     <a:ext uri="{9D8B030D-6E8A-4147-A177-3AD203B41FA5}">
-                      <a16:colId xmlns:a16="http://schemas.microsoft.com/office/drawing/2014/main" xmlns="" val="48614039"/>
+                      <a16:colId xmlns="" xmlns:a16="http://schemas.microsoft.com/office/drawing/2014/main" val="48614039"/>
                     </a:ext>
                   </a:extLst>
                 </a:gridCol>
                 <a:gridCol w="6742419">
                   <a:extLst>
                     <a:ext uri="{9D8B030D-6E8A-4147-A177-3AD203B41FA5}">
-                      <a16:colId xmlns:a16="http://schemas.microsoft.com/office/drawing/2014/main" xmlns="" val="1124546490"/>
+                      <a16:colId xmlns="" xmlns:a16="http://schemas.microsoft.com/office/drawing/2014/main" val="1124546490"/>
                     </a:ext>
                   </a:extLst>
                 </a:gridCol>
@@ -22523,7 +22509,7 @@
                 </a:tc>
                 <a:extLst>
                   <a:ext uri="{0D108BD9-81ED-4DB2-BD59-A6C34878D82A}">
-                    <a16:rowId xmlns:a16="http://schemas.microsoft.com/office/drawing/2014/main" xmlns="" val="679667022"/>
+                    <a16:rowId xmlns="" xmlns:a16="http://schemas.microsoft.com/office/drawing/2014/main" val="679667022"/>
                   </a:ext>
                 </a:extLst>
               </a:tr>
@@ -22570,7 +22556,7 @@
                 </a:tc>
                 <a:extLst>
                   <a:ext uri="{0D108BD9-81ED-4DB2-BD59-A6C34878D82A}">
-                    <a16:rowId xmlns:a16="http://schemas.microsoft.com/office/drawing/2014/main" xmlns="" val="2034482246"/>
+                    <a16:rowId xmlns="" xmlns:a16="http://schemas.microsoft.com/office/drawing/2014/main" val="2034482246"/>
                   </a:ext>
                 </a:extLst>
               </a:tr>
@@ -22617,7 +22603,7 @@
                 </a:tc>
                 <a:extLst>
                   <a:ext uri="{0D108BD9-81ED-4DB2-BD59-A6C34878D82A}">
-                    <a16:rowId xmlns:a16="http://schemas.microsoft.com/office/drawing/2014/main" xmlns="" val="682465758"/>
+                    <a16:rowId xmlns="" xmlns:a16="http://schemas.microsoft.com/office/drawing/2014/main" val="682465758"/>
                   </a:ext>
                 </a:extLst>
               </a:tr>
@@ -22669,7 +22655,7 @@
                 </a:tc>
                 <a:extLst>
                   <a:ext uri="{0D108BD9-81ED-4DB2-BD59-A6C34878D82A}">
-                    <a16:rowId xmlns:a16="http://schemas.microsoft.com/office/drawing/2014/main" xmlns="" val="4230228483"/>
+                    <a16:rowId xmlns="" xmlns:a16="http://schemas.microsoft.com/office/drawing/2014/main" val="4230228483"/>
                   </a:ext>
                 </a:extLst>
               </a:tr>
@@ -22716,7 +22702,7 @@
                 </a:tc>
                 <a:extLst>
                   <a:ext uri="{0D108BD9-81ED-4DB2-BD59-A6C34878D82A}">
-                    <a16:rowId xmlns:a16="http://schemas.microsoft.com/office/drawing/2014/main" xmlns="" val="3329658239"/>
+                    <a16:rowId xmlns="" xmlns:a16="http://schemas.microsoft.com/office/drawing/2014/main" val="3329658239"/>
                   </a:ext>
                 </a:extLst>
               </a:tr>
@@ -22783,7 +22769,7 @@
                 </a:tc>
                 <a:extLst>
                   <a:ext uri="{0D108BD9-81ED-4DB2-BD59-A6C34878D82A}">
-                    <a16:rowId xmlns:a16="http://schemas.microsoft.com/office/drawing/2014/main" xmlns="" val="10005"/>
+                    <a16:rowId xmlns="" xmlns:a16="http://schemas.microsoft.com/office/drawing/2014/main" val="10005"/>
                   </a:ext>
                 </a:extLst>
               </a:tr>
@@ -25480,7 +25466,7 @@
   <a:extraClrSchemeLst/>
   <a:extLst>
     <a:ext uri="{05A4C25C-085E-4340-85A3-A5531E510DB2}">
-      <thm15:themeFamily xmlns:thm15="http://schemas.microsoft.com/office/thememl/2012/main" xmlns="" name="Office Theme" id="{62F939B6-93AF-4DB8-9C6B-D6C7DFDC589F}" vid="{4A3C46E8-61CC-4603-A589-7422A47A8E4A}"/>
+      <thm15:themeFamily xmlns:thm15="http://schemas.microsoft.com/office/thememl/2012/main" name="Office Theme" id="{62F939B6-93AF-4DB8-9C6B-D6C7DFDC589F}" vid="{4A3C46E8-61CC-4603-A589-7422A47A8E4A}"/>
     </a:ext>
   </a:extLst>
 </a:theme>
@@ -25775,7 +25761,7 @@
   <a:extraClrSchemeLst/>
   <a:extLst>
     <a:ext uri="{05A4C25C-085E-4340-85A3-A5531E510DB2}">
-      <thm15:themeFamily xmlns:thm15="http://schemas.microsoft.com/office/thememl/2012/main" xmlns="" name="Office Theme" id="{62F939B6-93AF-4DB8-9C6B-D6C7DFDC589F}" vid="{4A3C46E8-61CC-4603-A589-7422A47A8E4A}"/>
+      <thm15:themeFamily xmlns:thm15="http://schemas.microsoft.com/office/thememl/2012/main" name="Office Theme" id="{62F939B6-93AF-4DB8-9C6B-D6C7DFDC589F}" vid="{4A3C46E8-61CC-4603-A589-7422A47A8E4A}"/>
     </a:ext>
   </a:extLst>
 </a:theme>

</xml_diff>